<commit_message>
Day 2 - Intro to MongoDB
</commit_message>
<xml_diff>
--- a/Sessions/Day 1 - Intro to NoSQL/Intro to NoSQL.pptx
+++ b/Sessions/Day 1 - Intro to NoSQL/Intro to NoSQL.pptx
@@ -5,10 +5,10 @@
     <p:sldMasterId id="2147483660" r:id="rId4"/>
   </p:sldMasterIdLst>
   <p:notesMasterIdLst>
-    <p:notesMasterId r:id="rId28"/>
+    <p:notesMasterId r:id="rId29"/>
   </p:notesMasterIdLst>
   <p:handoutMasterIdLst>
-    <p:handoutMasterId r:id="rId29"/>
+    <p:handoutMasterId r:id="rId30"/>
   </p:handoutMasterIdLst>
   <p:sldIdLst>
     <p:sldId id="257" r:id="rId5"/>
@@ -30,10 +30,11 @@
     <p:sldId id="289" r:id="rId21"/>
     <p:sldId id="290" r:id="rId22"/>
     <p:sldId id="291" r:id="rId23"/>
-    <p:sldId id="292" r:id="rId24"/>
-    <p:sldId id="293" r:id="rId25"/>
-    <p:sldId id="294" r:id="rId26"/>
-    <p:sldId id="295" r:id="rId27"/>
+    <p:sldId id="296" r:id="rId24"/>
+    <p:sldId id="292" r:id="rId25"/>
+    <p:sldId id="293" r:id="rId26"/>
+    <p:sldId id="294" r:id="rId27"/>
+    <p:sldId id="295" r:id="rId28"/>
   </p:sldIdLst>
   <p:sldSz cx="12188825" cy="6858000"/>
   <p:notesSz cx="6858000" cy="9144000"/>
@@ -247,7 +248,7 @@
           <a:p>
             <a:fld id="{FE5B4EDC-59C0-49C7-8ADA-5A781B329E02}" type="datetimeFigureOut">
               <a:rPr lang="en-US"/>
-              <a:t>8/17/2022</a:t>
+              <a:t>10/11/2022</a:t>
             </a:fld>
             <a:endParaRPr/>
           </a:p>
@@ -412,7 +413,7 @@
           <a:p>
             <a:fld id="{F2D8D46A-B586-417D-BFBD-8C8FE0AAF762}" type="datetimeFigureOut">
               <a:rPr lang="en-US"/>
-              <a:t>8/17/2022</a:t>
+              <a:t>10/11/2022</a:t>
             </a:fld>
             <a:endParaRPr/>
           </a:p>
@@ -1430,7 +1431,7 @@
           <a:p>
             <a:fld id="{F0DFD029-FB74-4578-B929-F66AA97659CA}" type="datetimeFigureOut">
               <a:rPr lang="en-US"/>
-              <a:t>8/17/2022</a:t>
+              <a:t>10/11/2022</a:t>
             </a:fld>
             <a:endParaRPr/>
           </a:p>
@@ -1628,7 +1629,7 @@
           <a:p>
             <a:fld id="{F0DFD029-FB74-4578-B929-F66AA97659CA}" type="datetimeFigureOut">
               <a:rPr lang="en-US"/>
-              <a:t>8/17/2022</a:t>
+              <a:t>10/11/2022</a:t>
             </a:fld>
             <a:endParaRPr/>
           </a:p>
@@ -1836,7 +1837,7 @@
           <a:p>
             <a:fld id="{F0DFD029-FB74-4578-B929-F66AA97659CA}" type="datetimeFigureOut">
               <a:rPr lang="en-US"/>
-              <a:t>8/17/2022</a:t>
+              <a:t>10/11/2022</a:t>
             </a:fld>
             <a:endParaRPr/>
           </a:p>
@@ -2034,7 +2035,7 @@
           <a:p>
             <a:fld id="{F0DFD029-FB74-4578-B929-F66AA97659CA}" type="datetimeFigureOut">
               <a:rPr lang="en-US"/>
-              <a:t>8/17/2022</a:t>
+              <a:t>10/11/2022</a:t>
             </a:fld>
             <a:endParaRPr/>
           </a:p>
@@ -2466,7 +2467,7 @@
           <a:p>
             <a:fld id="{F0DFD029-FB74-4578-B929-F66AA97659CA}" type="datetimeFigureOut">
               <a:rPr lang="en-US"/>
-              <a:t>8/17/2022</a:t>
+              <a:t>10/11/2022</a:t>
             </a:fld>
             <a:endParaRPr/>
           </a:p>
@@ -2770,7 +2771,7 @@
           <a:p>
             <a:fld id="{F0DFD029-FB74-4578-B929-F66AA97659CA}" type="datetimeFigureOut">
               <a:rPr lang="en-US"/>
-              <a:t>8/17/2022</a:t>
+              <a:t>10/11/2022</a:t>
             </a:fld>
             <a:endParaRPr/>
           </a:p>
@@ -3226,7 +3227,7 @@
           <a:p>
             <a:fld id="{F0DFD029-FB74-4578-B929-F66AA97659CA}" type="datetimeFigureOut">
               <a:rPr lang="en-US"/>
-              <a:t>8/17/2022</a:t>
+              <a:t>10/11/2022</a:t>
             </a:fld>
             <a:endParaRPr/>
           </a:p>
@@ -3356,7 +3357,7 @@
           <a:p>
             <a:fld id="{F0DFD029-FB74-4578-B929-F66AA97659CA}" type="datetimeFigureOut">
               <a:rPr lang="en-US"/>
-              <a:t>8/17/2022</a:t>
+              <a:t>10/11/2022</a:t>
             </a:fld>
             <a:endParaRPr/>
           </a:p>
@@ -3463,7 +3464,7 @@
           <a:p>
             <a:fld id="{F0DFD029-FB74-4578-B929-F66AA97659CA}" type="datetimeFigureOut">
               <a:rPr lang="en-US"/>
-              <a:t>8/17/2022</a:t>
+              <a:t>10/11/2022</a:t>
             </a:fld>
             <a:endParaRPr/>
           </a:p>
@@ -3762,7 +3763,7 @@
           <a:p>
             <a:fld id="{F0DFD029-FB74-4578-B929-F66AA97659CA}" type="datetimeFigureOut">
               <a:rPr lang="en-US"/>
-              <a:t>8/17/2022</a:t>
+              <a:t>10/11/2022</a:t>
             </a:fld>
             <a:endParaRPr/>
           </a:p>
@@ -4050,7 +4051,7 @@
           <a:p>
             <a:fld id="{F0DFD029-FB74-4578-B929-F66AA97659CA}" type="datetimeFigureOut">
               <a:rPr lang="en-US"/>
-              <a:t>8/17/2022</a:t>
+              <a:t>10/11/2022</a:t>
             </a:fld>
             <a:endParaRPr/>
           </a:p>
@@ -4673,7 +4674,7 @@
             <a:fld id="{F0DFD029-FB74-4578-B929-F66AA97659CA}" type="datetimeFigureOut">
               <a:rPr lang="en-US"/>
               <a:pPr/>
-              <a:t>8/17/2022</a:t>
+              <a:t>10/11/2022</a:t>
             </a:fld>
             <a:endParaRPr/>
           </a:p>
@@ -6024,15 +6025,6 @@
           <a:solidFill>
             <a:srgbClr val="FFFFFF"/>
           </a:solidFill>
-          <a:extLst>
-            <a:ext uri="{909E8E84-426E-40DD-AFC4-6F175D3DCCD1}">
-              <a14:hiddenFill xmlns:a14="http://schemas.microsoft.com/office/drawing/2010/main">
-                <a:solidFill>
-                  <a:srgbClr val="FFFFFF"/>
-                </a:solidFill>
-              </a14:hiddenFill>
-            </a:ext>
-          </a:extLst>
         </p:spPr>
       </p:pic>
     </p:spTree>
@@ -6719,7 +6711,47 @@
           <a:p>
             <a:r>
               <a:rPr lang="en-US" sz="2400" dirty="0"/>
-              <a:t>CAP theorem or Eric Brewers theorem states that we can only achieve at most two out of three guarantees for a database: Consistency, Availability and Partition Tolerance.</a:t>
+              <a:t>CAP theorem or Eric Brewers theorem states that a </a:t>
+            </a:r>
+            <a:r>
+              <a:rPr lang="en-US" sz="2400" dirty="0">
+                <a:hlinkClick r:id="rId2">
+                  <a:extLst>
+                    <a:ext uri="{A12FA001-AC4F-418D-AE19-62706E023703}">
+                      <ahyp:hlinkClr xmlns:ahyp="http://schemas.microsoft.com/office/drawing/2018/hyperlinkcolor" val="tx"/>
+                    </a:ext>
+                  </a:extLst>
+                </a:hlinkClick>
+              </a:rPr>
+              <a:t>distributed system</a:t>
+            </a:r>
+            <a:r>
+              <a:rPr lang="en-US" sz="2400" dirty="0"/>
+              <a:t> can only provide two out of three guarantees simultaneously: </a:t>
+            </a:r>
+            <a:r>
+              <a:rPr lang="en-US" sz="2400" b="1" u="sng" dirty="0"/>
+              <a:t>Consistency</a:t>
+            </a:r>
+            <a:r>
+              <a:rPr lang="en-US" sz="2400" dirty="0"/>
+              <a:t>, </a:t>
+            </a:r>
+            <a:r>
+              <a:rPr lang="en-US" sz="2400" b="1" u="sng" dirty="0"/>
+              <a:t>Availability</a:t>
+            </a:r>
+            <a:r>
+              <a:rPr lang="en-US" sz="2400" dirty="0"/>
+              <a:t> and </a:t>
+            </a:r>
+            <a:r>
+              <a:rPr lang="en-US" sz="2400" b="1" u="sng" dirty="0"/>
+              <a:t>Partition Tolerance</a:t>
+            </a:r>
+            <a:r>
+              <a:rPr lang="en-US" sz="2400" dirty="0"/>
+              <a:t>.</a:t>
             </a:r>
           </a:p>
           <a:p>
@@ -6840,7 +6872,7 @@
           <a:p>
             <a:r>
               <a:rPr lang="en-US" b="1" dirty="0"/>
-              <a:t>CAP Theorem</a:t>
+              <a:t>CAP Theorem Proof</a:t>
             </a:r>
             <a:endParaRPr lang="en-IN" b="1" dirty="0"/>
           </a:p>
@@ -6848,50 +6880,32 @@
       </p:sp>
       <p:pic>
         <p:nvPicPr>
-          <p:cNvPr id="1026" name="Picture 2">
+          <p:cNvPr id="3" name="Picture 2">
             <a:extLst>
               <a:ext uri="{FF2B5EF4-FFF2-40B4-BE49-F238E27FC236}">
-                <a16:creationId xmlns:a16="http://schemas.microsoft.com/office/drawing/2014/main" id="{AA0DC7F6-AB85-AF1B-D131-706139E17675}"/>
+                <a16:creationId xmlns:a16="http://schemas.microsoft.com/office/drawing/2014/main" id="{47FE3E1C-D059-8095-BFA4-AA678B7609F2}"/>
               </a:ext>
             </a:extLst>
           </p:cNvPr>
           <p:cNvPicPr>
-            <a:picLocks noChangeAspect="1" noChangeArrowheads="1"/>
+            <a:picLocks noChangeAspect="1"/>
           </p:cNvPicPr>
           <p:nvPr/>
         </p:nvPicPr>
         <p:blipFill>
-          <a:blip r:embed="rId2">
-            <a:extLst>
-              <a:ext uri="{28A0092B-C50C-407E-A947-70E740481C1C}">
-                <a14:useLocalDpi xmlns:a14="http://schemas.microsoft.com/office/drawing/2010/main" val="0"/>
-              </a:ext>
-            </a:extLst>
-          </a:blip>
+          <a:blip r:embed="rId2"/>
           <a:stretch>
             <a:fillRect/>
           </a:stretch>
         </p:blipFill>
-        <p:spPr bwMode="auto">
+        <p:spPr>
           <a:xfrm>
-            <a:off x="2566021" y="1498600"/>
-            <a:ext cx="6912768" cy="5184576"/>
+            <a:off x="2301809" y="1772816"/>
+            <a:ext cx="7585206" cy="4455750"/>
           </a:xfrm>
           <a:prstGeom prst="rect">
             <a:avLst/>
           </a:prstGeom>
-          <a:solidFill>
-            <a:srgbClr val="FFFFFF"/>
-          </a:solidFill>
-          <a:extLst>
-            <a:ext uri="{909E8E84-426E-40DD-AFC4-6F175D3DCCD1}">
-              <a14:hiddenFill xmlns:a14="http://schemas.microsoft.com/office/drawing/2010/main">
-                <a:solidFill>
-                  <a:srgbClr val="FFFFFF"/>
-                </a:solidFill>
-              </a14:hiddenFill>
-            </a:ext>
-          </a:extLst>
         </p:spPr>
       </p:pic>
     </p:spTree>
@@ -7016,6 +7030,113 @@
 </file>
 
 <file path=ppt/slides/slide20.xml><?xml version="1.0" encoding="utf-8"?>
+<p:sld xmlns:a="http://schemas.openxmlformats.org/drawingml/2006/main" xmlns:r="http://schemas.openxmlformats.org/officeDocument/2006/relationships" xmlns:p="http://schemas.openxmlformats.org/presentationml/2006/main">
+  <p:cSld>
+    <p:spTree>
+      <p:nvGrpSpPr>
+        <p:cNvPr id="1" name=""/>
+        <p:cNvGrpSpPr/>
+        <p:nvPr/>
+      </p:nvGrpSpPr>
+      <p:grpSpPr>
+        <a:xfrm>
+          <a:off x="0" y="0"/>
+          <a:ext cx="0" cy="0"/>
+          <a:chOff x="0" y="0"/>
+          <a:chExt cx="0" cy="0"/>
+        </a:xfrm>
+      </p:grpSpPr>
+      <p:sp>
+        <p:nvSpPr>
+          <p:cNvPr id="13" name="Title 12"/>
+          <p:cNvSpPr>
+            <a:spLocks noGrp="1"/>
+          </p:cNvSpPr>
+          <p:nvPr>
+            <p:ph type="title"/>
+          </p:nvPr>
+        </p:nvSpPr>
+        <p:spPr>
+          <a:xfrm>
+            <a:off x="1218883" y="274637"/>
+            <a:ext cx="10360501" cy="1223963"/>
+          </a:xfrm>
+        </p:spPr>
+        <p:txBody>
+          <a:bodyPr anchor="b">
+            <a:normAutofit/>
+          </a:bodyPr>
+          <a:lstStyle/>
+          <a:p>
+            <a:r>
+              <a:rPr lang="en-US" b="1" dirty="0"/>
+              <a:t>CAP Theorem</a:t>
+            </a:r>
+            <a:endParaRPr lang="en-IN" b="1" dirty="0"/>
+          </a:p>
+        </p:txBody>
+      </p:sp>
+      <p:pic>
+        <p:nvPicPr>
+          <p:cNvPr id="1026" name="Picture 2">
+            <a:extLst>
+              <a:ext uri="{FF2B5EF4-FFF2-40B4-BE49-F238E27FC236}">
+                <a16:creationId xmlns:a16="http://schemas.microsoft.com/office/drawing/2014/main" id="{AA0DC7F6-AB85-AF1B-D131-706139E17675}"/>
+              </a:ext>
+            </a:extLst>
+          </p:cNvPr>
+          <p:cNvPicPr>
+            <a:picLocks noChangeAspect="1" noChangeArrowheads="1"/>
+          </p:cNvPicPr>
+          <p:nvPr/>
+        </p:nvPicPr>
+        <p:blipFill>
+          <a:blip r:embed="rId2">
+            <a:extLst>
+              <a:ext uri="{28A0092B-C50C-407E-A947-70E740481C1C}">
+                <a14:useLocalDpi xmlns:a14="http://schemas.microsoft.com/office/drawing/2010/main" val="0"/>
+              </a:ext>
+            </a:extLst>
+          </a:blip>
+          <a:stretch>
+            <a:fillRect/>
+          </a:stretch>
+        </p:blipFill>
+        <p:spPr bwMode="auto">
+          <a:xfrm>
+            <a:off x="2566021" y="1498600"/>
+            <a:ext cx="6912768" cy="5184576"/>
+          </a:xfrm>
+          <a:prstGeom prst="rect">
+            <a:avLst/>
+          </a:prstGeom>
+          <a:solidFill>
+            <a:srgbClr val="FFFFFF"/>
+          </a:solidFill>
+        </p:spPr>
+      </p:pic>
+    </p:spTree>
+    <p:extLst>
+      <p:ext uri="{BB962C8B-B14F-4D97-AF65-F5344CB8AC3E}">
+        <p14:creationId xmlns:p14="http://schemas.microsoft.com/office/powerpoint/2010/main" val="590741503"/>
+      </p:ext>
+    </p:extLst>
+  </p:cSld>
+  <p:clrMapOvr>
+    <a:masterClrMapping/>
+  </p:clrMapOvr>
+  <mc:AlternateContent xmlns:mc="http://schemas.openxmlformats.org/markup-compatibility/2006" xmlns:p14="http://schemas.microsoft.com/office/powerpoint/2010/main">
+    <mc:Choice Requires="p14">
+      <p:transition p14:dur="0"/>
+    </mc:Choice>
+    <mc:Fallback xmlns="">
+      <p:transition/>
+    </mc:Fallback>
+  </mc:AlternateContent>
+</p:sld>
+</file>
+
+<file path=ppt/slides/slide21.xml><?xml version="1.0" encoding="utf-8"?>
 <p:sld xmlns:a="http://schemas.openxmlformats.org/drawingml/2006/main" xmlns:r="http://schemas.openxmlformats.org/officeDocument/2006/relationships" xmlns:p="http://schemas.openxmlformats.org/presentationml/2006/main">
   <p:cSld>
     <p:spTree>
@@ -7470,7 +7591,7 @@
 </p:sld>
 </file>
 
-<file path=ppt/slides/slide21.xml><?xml version="1.0" encoding="utf-8"?>
+<file path=ppt/slides/slide22.xml><?xml version="1.0" encoding="utf-8"?>
 <p:sld xmlns:a="http://schemas.openxmlformats.org/drawingml/2006/main" xmlns:r="http://schemas.openxmlformats.org/officeDocument/2006/relationships" xmlns:p="http://schemas.openxmlformats.org/presentationml/2006/main">
   <p:cSld>
     <p:spTree>
@@ -7631,7 +7752,7 @@
 </p:sld>
 </file>
 
-<file path=ppt/slides/slide22.xml><?xml version="1.0" encoding="utf-8"?>
+<file path=ppt/slides/slide23.xml><?xml version="1.0" encoding="utf-8"?>
 <p:sld xmlns:a="http://schemas.openxmlformats.org/drawingml/2006/main" xmlns:r="http://schemas.openxmlformats.org/officeDocument/2006/relationships" xmlns:p="http://schemas.openxmlformats.org/presentationml/2006/main">
   <p:cSld>
     <p:spTree>
@@ -7793,7 +7914,7 @@
 </p:sld>
 </file>
 
-<file path=ppt/slides/slide23.xml><?xml version="1.0" encoding="utf-8"?>
+<file path=ppt/slides/slide24.xml><?xml version="1.0" encoding="utf-8"?>
 <p:sld xmlns:a="http://schemas.openxmlformats.org/drawingml/2006/main" xmlns:r="http://schemas.openxmlformats.org/officeDocument/2006/relationships" xmlns:p="http://schemas.openxmlformats.org/presentationml/2006/main">
   <p:cSld>
     <p:spTree>
@@ -9728,6 +9849,15 @@
 </file>
 
 <file path=customXml/item1.xml><?xml version="1.0" encoding="utf-8"?>
+<?mso-contentType ?>
+<FormTemplates xmlns="http://schemas.microsoft.com/sharepoint/v3/contenttype/forms">
+  <Display>DocumentLibraryForm</Display>
+  <Edit>AssetEditForm</Edit>
+  <New>DocumentLibraryForm</New>
+</FormTemplates>
+</file>
+
+<file path=customXml/item2.xml><?xml version="1.0" encoding="utf-8"?>
 <p:properties xmlns:p="http://schemas.microsoft.com/office/2006/metadata/properties" xmlns:xsi="http://www.w3.org/2001/XMLSchema-instance" xmlns:pc="http://schemas.microsoft.com/office/infopath/2007/PartnerControls">
   <documentManagement>
     <LocPublishedLinkedAssetsLookup xmlns="4873beb7-5857-4685-be1f-d57550cc96cc" xsi:nil="true"/>
@@ -9861,15 +9991,6 @@
     <LocMarketGroupTiers2 xmlns="4873beb7-5857-4685-be1f-d57550cc96cc" xsi:nil="true"/>
   </documentManagement>
 </p:properties>
-</file>
-
-<file path=customXml/item2.xml><?xml version="1.0" encoding="utf-8"?>
-<?mso-contentType ?>
-<FormTemplates xmlns="http://schemas.microsoft.com/sharepoint/v3/contenttype/forms">
-  <Display>DocumentLibraryForm</Display>
-  <Edit>AssetEditForm</Edit>
-  <New>DocumentLibraryForm</New>
-</FormTemplates>
 </file>
 
 <file path=customXml/item3.xml><?xml version="1.0" encoding="utf-8"?>
@@ -10913,6 +11034,14 @@
 </file>
 
 <file path=customXml/itemProps1.xml><?xml version="1.0" encoding="utf-8"?>
+<ds:datastoreItem xmlns:ds="http://schemas.openxmlformats.org/officeDocument/2006/customXml" ds:itemID="{3836F65B-1B07-41EE-A0E8-BC6EF3855225}">
+  <ds:schemaRefs>
+    <ds:schemaRef ds:uri="http://schemas.microsoft.com/sharepoint/v3/contenttype/forms"/>
+  </ds:schemaRefs>
+</ds:datastoreItem>
+</file>
+
+<file path=customXml/itemProps2.xml><?xml version="1.0" encoding="utf-8"?>
 <ds:datastoreItem xmlns:ds="http://schemas.openxmlformats.org/officeDocument/2006/customXml" ds:itemID="{60C67BEE-D13F-4BD2-98A5-34D8A0977F68}">
   <ds:schemaRefs>
     <ds:schemaRef ds:uri="4873beb7-5857-4685-be1f-d57550cc96cc"/>
@@ -10924,14 +11053,6 @@
     <ds:schemaRef ds:uri="http://schemas.microsoft.com/office/infopath/2007/PartnerControls"/>
     <ds:schemaRef ds:uri="http://www.w3.org/XML/1998/namespace"/>
     <ds:schemaRef ds:uri="http://purl.org/dc/dcmitype/"/>
-  </ds:schemaRefs>
-</ds:datastoreItem>
-</file>
-
-<file path=customXml/itemProps2.xml><?xml version="1.0" encoding="utf-8"?>
-<ds:datastoreItem xmlns:ds="http://schemas.openxmlformats.org/officeDocument/2006/customXml" ds:itemID="{3836F65B-1B07-41EE-A0E8-BC6EF3855225}">
-  <ds:schemaRefs>
-    <ds:schemaRef ds:uri="http://schemas.microsoft.com/sharepoint/v3/contenttype/forms"/>
   </ds:schemaRefs>
 </ds:datastoreItem>
 </file>

</xml_diff>